<commit_message>
Fix presentation layout misplace
</commit_message>
<xml_diff>
--- a/code-mates.pptx
+++ b/code-mates.pptx
@@ -255,7 +255,7 @@
           <a:p>
             <a:fld id="{88EDFB7E-8A14-5F4A-A8BC-FEC574E653A4}" type="datetimeFigureOut">
               <a:rPr lang="en-US" smtClean="0"/>
-              <a:t>10/27/2019</a:t>
+              <a:t>10/28/2019</a:t>
             </a:fld>
             <a:endParaRPr lang="en-US"/>
           </a:p>
@@ -1230,7 +1230,7 @@
           <a:p>
             <a:fld id="{B50CD552-C10E-614A-B810-77E320220E26}" type="datetimeFigureOut">
               <a:rPr lang="en-US" smtClean="0"/>
-              <a:t>10/27/2019</a:t>
+              <a:t>10/28/2019</a:t>
             </a:fld>
             <a:endParaRPr lang="en-US"/>
           </a:p>
@@ -38900,7 +38900,7 @@
           <a:p>
             <a:fld id="{B50CD552-C10E-614A-B810-77E320220E26}" type="datetimeFigureOut">
               <a:rPr lang="en-US" smtClean="0"/>
-              <a:t>10/27/2019</a:t>
+              <a:t>10/28/2019</a:t>
             </a:fld>
             <a:endParaRPr lang="en-US"/>
           </a:p>
@@ -41401,14 +41401,14 @@
           </a:ln>
           <a:extLst>
             <a:ext uri="{909E8E84-426E-40dd-AFC4-6F175D3DCCD1}">
-              <a14:hiddenFill xmlns="" xmlns:a14="http://schemas.microsoft.com/office/drawing/2010/main">
+              <a14:hiddenFill xmlns:a14="http://schemas.microsoft.com/office/drawing/2010/main" xmlns="">
                 <a:solidFill>
                   <a:srgbClr val="FFFFFF"/>
                 </a:solidFill>
               </a14:hiddenFill>
             </a:ext>
             <a:ext uri="{91240B29-F687-4f45-9708-019B960494DF}">
-              <a14:hiddenLine xmlns="" xmlns:a14="http://schemas.microsoft.com/office/drawing/2010/main" w="12700">
+              <a14:hiddenLine xmlns:a14="http://schemas.microsoft.com/office/drawing/2010/main" xmlns="" w="12700">
                 <a:solidFill>
                   <a:schemeClr val="tx1"/>
                 </a:solidFill>
@@ -42235,7 +42235,7 @@
         </p:nvSpPr>
         <p:spPr>
           <a:xfrm>
-            <a:off x="6807201" y="5099979"/>
+            <a:off x="6803498" y="5024907"/>
             <a:ext cx="2899642" cy="1348703"/>
           </a:xfrm>
           <a:prstGeom prst="rect">
@@ -42299,7 +42299,7 @@
         </p:nvSpPr>
         <p:spPr>
           <a:xfrm>
-            <a:off x="8898096" y="4633533"/>
+            <a:off x="8861242" y="4558460"/>
             <a:ext cx="841898" cy="369332"/>
           </a:xfrm>
           <a:prstGeom prst="rect">
@@ -42537,7 +42537,7 @@
         </p:blipFill>
         <p:spPr>
           <a:xfrm>
-            <a:off x="9163140" y="3996419"/>
+            <a:off x="9165532" y="4018460"/>
             <a:ext cx="540000" cy="540000"/>
           </a:xfrm>
           <a:prstGeom prst="rect">

</xml_diff>